<commit_message>
add a few comments to lecture 6
</commit_message>
<xml_diff>
--- a/Lecture 6/Lecture.pptx
+++ b/Lecture 6/Lecture.pptx
@@ -29,10 +29,10 @@
     <p:sldId id="290" r:id="rId20"/>
     <p:sldId id="271" r:id="rId21"/>
     <p:sldId id="294" r:id="rId22"/>
-    <p:sldId id="272" r:id="rId23"/>
-    <p:sldId id="291" r:id="rId24"/>
-    <p:sldId id="292" r:id="rId25"/>
-    <p:sldId id="293" r:id="rId26"/>
+    <p:sldId id="291" r:id="rId23"/>
+    <p:sldId id="292" r:id="rId24"/>
+    <p:sldId id="293" r:id="rId25"/>
+    <p:sldId id="272" r:id="rId26"/>
     <p:sldId id="273" r:id="rId27"/>
     <p:sldId id="274" r:id="rId28"/>
     <p:sldId id="275" r:id="rId29"/>
@@ -14050,8 +14050,12 @@
           <a:lstStyle/>
           <a:p>
             <a:r>
-              <a:rPr lang="en-US" smtClean="0"/>
-              <a:t>startActivity(Activity </a:t>
+              <a:rPr lang="en-US" dirty="0" err="1" smtClean="0"/>
+              <a:t>startActivity</a:t>
+            </a:r>
+            <a:r>
+              <a:rPr lang="en-US" dirty="0" smtClean="0"/>
+              <a:t>(Activity </a:t>
             </a:r>
             <a:r>
               <a:rPr lang="en-US" dirty="0" smtClean="0"/>
@@ -14090,80 +14094,6 @@
 </file>
 
 <file path=ppt/slides/slide22.xml><?xml version="1.0" encoding="utf-8"?>
-<p:sld xmlns:a="http://schemas.openxmlformats.org/drawingml/2006/main" xmlns:r="http://schemas.openxmlformats.org/officeDocument/2006/relationships" xmlns:p="http://schemas.openxmlformats.org/presentationml/2006/main">
-  <p:cSld>
-    <p:spTree>
-      <p:nvGrpSpPr>
-        <p:cNvPr id="1" name=""/>
-        <p:cNvGrpSpPr/>
-        <p:nvPr/>
-      </p:nvGrpSpPr>
-      <p:grpSpPr>
-        <a:xfrm>
-          <a:off x="0" y="0"/>
-          <a:ext cx="0" cy="0"/>
-          <a:chOff x="0" y="0"/>
-          <a:chExt cx="0" cy="0"/>
-        </a:xfrm>
-      </p:grpSpPr>
-      <p:sp>
-        <p:nvSpPr>
-          <p:cNvPr id="2" name="Title 1"/>
-          <p:cNvSpPr>
-            <a:spLocks noGrp="1"/>
-          </p:cNvSpPr>
-          <p:nvPr>
-            <p:ph type="title"/>
-          </p:nvPr>
-        </p:nvSpPr>
-        <p:spPr/>
-        <p:txBody>
-          <a:bodyPr/>
-          <a:lstStyle/>
-          <a:p>
-            <a:r>
-              <a:rPr lang="en-US" dirty="0"/>
-              <a:t> Intent </a:t>
-            </a:r>
-          </a:p>
-        </p:txBody>
-      </p:sp>
-      <p:sp>
-        <p:nvSpPr>
-          <p:cNvPr id="3" name="Content Placeholder 2"/>
-          <p:cNvSpPr>
-            <a:spLocks noGrp="1"/>
-          </p:cNvSpPr>
-          <p:nvPr>
-            <p:ph idx="1"/>
-          </p:nvPr>
-        </p:nvSpPr>
-        <p:spPr/>
-        <p:txBody>
-          <a:bodyPr/>
-          <a:lstStyle/>
-          <a:p>
-            <a:r>
-              <a:rPr lang="en-US" dirty="0"/>
-              <a:t>The Intent object specifies either the exact activity you want to start or describes the type of action you want to perform (and the system selects the appropriate activity for you, which can even be from a different application). An Intent object can also carry small amounts of data to be used by the activity that is started.</a:t>
-            </a:r>
-          </a:p>
-        </p:txBody>
-      </p:sp>
-    </p:spTree>
-    <p:extLst>
-      <p:ext uri="{BB962C8B-B14F-4D97-AF65-F5344CB8AC3E}">
-        <p14:creationId xmlns:p14="http://schemas.microsoft.com/office/powerpoint/2010/main" val="483665238"/>
-      </p:ext>
-    </p:extLst>
-  </p:cSld>
-  <p:clrMapOvr>
-    <a:masterClrMapping/>
-  </p:clrMapOvr>
-</p:sld>
-</file>
-
-<file path=ppt/slides/slide23.xml><?xml version="1.0" encoding="utf-8"?>
 <p:sld xmlns:a="http://schemas.openxmlformats.org/drawingml/2006/main" xmlns:r="http://schemas.openxmlformats.org/officeDocument/2006/relationships" xmlns:p="http://schemas.openxmlformats.org/presentationml/2006/main">
   <p:cSld>
     <p:spTree>
@@ -14222,7 +14152,7 @@
 </p:sld>
 </file>
 
-<file path=ppt/slides/slide24.xml><?xml version="1.0" encoding="utf-8"?>
+<file path=ppt/slides/slide23.xml><?xml version="1.0" encoding="utf-8"?>
 <p:sld xmlns:a="http://schemas.openxmlformats.org/drawingml/2006/main" xmlns:r="http://schemas.openxmlformats.org/officeDocument/2006/relationships" xmlns:p="http://schemas.openxmlformats.org/presentationml/2006/main">
   <p:cSld>
     <p:spTree>
@@ -14281,7 +14211,7 @@
 </p:sld>
 </file>
 
-<file path=ppt/slides/slide25.xml><?xml version="1.0" encoding="utf-8"?>
+<file path=ppt/slides/slide24.xml><?xml version="1.0" encoding="utf-8"?>
 <p:sld xmlns:a="http://schemas.openxmlformats.org/drawingml/2006/main" xmlns:r="http://schemas.openxmlformats.org/officeDocument/2006/relationships" xmlns:p="http://schemas.openxmlformats.org/presentationml/2006/main">
   <p:cSld>
     <p:spTree>
@@ -14331,6 +14261,80 @@
     <p:extLst>
       <p:ext uri="{BB962C8B-B14F-4D97-AF65-F5344CB8AC3E}">
         <p14:creationId xmlns:p14="http://schemas.microsoft.com/office/powerpoint/2010/main" val="1533616214"/>
+      </p:ext>
+    </p:extLst>
+  </p:cSld>
+  <p:clrMapOvr>
+    <a:masterClrMapping/>
+  </p:clrMapOvr>
+</p:sld>
+</file>
+
+<file path=ppt/slides/slide25.xml><?xml version="1.0" encoding="utf-8"?>
+<p:sld xmlns:a="http://schemas.openxmlformats.org/drawingml/2006/main" xmlns:r="http://schemas.openxmlformats.org/officeDocument/2006/relationships" xmlns:p="http://schemas.openxmlformats.org/presentationml/2006/main">
+  <p:cSld>
+    <p:spTree>
+      <p:nvGrpSpPr>
+        <p:cNvPr id="1" name=""/>
+        <p:cNvGrpSpPr/>
+        <p:nvPr/>
+      </p:nvGrpSpPr>
+      <p:grpSpPr>
+        <a:xfrm>
+          <a:off x="0" y="0"/>
+          <a:ext cx="0" cy="0"/>
+          <a:chOff x="0" y="0"/>
+          <a:chExt cx="0" cy="0"/>
+        </a:xfrm>
+      </p:grpSpPr>
+      <p:sp>
+        <p:nvSpPr>
+          <p:cNvPr id="2" name="Title 1"/>
+          <p:cNvSpPr>
+            <a:spLocks noGrp="1"/>
+          </p:cNvSpPr>
+          <p:nvPr>
+            <p:ph type="title"/>
+          </p:nvPr>
+        </p:nvSpPr>
+        <p:spPr/>
+        <p:txBody>
+          <a:bodyPr/>
+          <a:lstStyle/>
+          <a:p>
+            <a:r>
+              <a:rPr lang="en-US" dirty="0"/>
+              <a:t> Intent </a:t>
+            </a:r>
+          </a:p>
+        </p:txBody>
+      </p:sp>
+      <p:sp>
+        <p:nvSpPr>
+          <p:cNvPr id="3" name="Content Placeholder 2"/>
+          <p:cNvSpPr>
+            <a:spLocks noGrp="1"/>
+          </p:cNvSpPr>
+          <p:nvPr>
+            <p:ph idx="1"/>
+          </p:nvPr>
+        </p:nvSpPr>
+        <p:spPr/>
+        <p:txBody>
+          <a:bodyPr/>
+          <a:lstStyle/>
+          <a:p>
+            <a:r>
+              <a:rPr lang="en-US" dirty="0"/>
+              <a:t>The Intent object specifies either the exact activity you want to start or describes the type of action you want to perform (and the system selects the appropriate activity for you, which can even be from a different application). An Intent object can also carry small amounts of data to be used by the activity that is started.</a:t>
+            </a:r>
+          </a:p>
+        </p:txBody>
+      </p:sp>
+    </p:spTree>
+    <p:extLst>
+      <p:ext uri="{BB962C8B-B14F-4D97-AF65-F5344CB8AC3E}">
+        <p14:creationId xmlns:p14="http://schemas.microsoft.com/office/powerpoint/2010/main" val="483665238"/>
       </p:ext>
     </p:extLst>
   </p:cSld>

</xml_diff>